<commit_message>
FC-22: add the document of io-server
</commit_message>
<xml_diff>
--- a/Doc/FC－Server-Architecture.pptx
+++ b/Doc/FC－Server-Architecture.pptx
@@ -3134,11 +3134,7 @@
           <a:p>
             <a:r>
               <a:rPr kumimoji="1" lang="zh-CN" altLang="en-US" dirty="0" smtClean="0"/>
-              <a:t>业务</a:t>
-            </a:r>
-            <a:r>
-              <a:rPr kumimoji="1" lang="zh-CN" altLang="en-US" dirty="0" smtClean="0"/>
-              <a:t>服务器</a:t>
+              <a:t>业务服务器</a:t>
             </a:r>
             <a:endParaRPr kumimoji="1" lang="en-US" altLang="zh-CN" dirty="0" smtClean="0"/>
           </a:p>
@@ -3447,12 +3443,19 @@
           <a:lstStyle/>
           <a:p>
             <a:r>
+              <a:rPr kumimoji="1" lang="zh-CN" altLang="en-US" dirty="0" smtClean="0"/>
+              <a:t>解决方案介绍</a:t>
+            </a:r>
+            <a:endParaRPr kumimoji="1" lang="en-US" altLang="zh-CN" dirty="0" smtClean="0"/>
+          </a:p>
+          <a:p>
+            <a:r>
               <a:rPr kumimoji="1" lang="zh-CN" altLang="en-US" dirty="0" smtClean="0">
                 <a:solidFill>
                   <a:srgbClr val="FF0000"/>
                 </a:solidFill>
               </a:rPr>
-              <a:t>解决方案介绍</a:t>
+              <a:t>服务器整体介绍</a:t>
             </a:r>
             <a:endParaRPr kumimoji="1" lang="en-US" altLang="zh-CN" dirty="0" smtClean="0">
               <a:solidFill>
@@ -3463,13 +3466,6 @@
           <a:p>
             <a:r>
               <a:rPr kumimoji="1" lang="zh-CN" altLang="en-US" dirty="0" smtClean="0"/>
-              <a:t>服务器整体介绍</a:t>
-            </a:r>
-            <a:endParaRPr kumimoji="1" lang="en-US" altLang="zh-CN" dirty="0" smtClean="0"/>
-          </a:p>
-          <a:p>
-            <a:r>
-              <a:rPr kumimoji="1" lang="zh-CN" altLang="en-US" dirty="0" smtClean="0"/>
               <a:t>设备服务器</a:t>
             </a:r>
             <a:endParaRPr kumimoji="1" lang="en-US" altLang="zh-CN" dirty="0" smtClean="0"/>
@@ -3484,11 +3480,7 @@
           <a:p>
             <a:r>
               <a:rPr kumimoji="1" lang="zh-CN" altLang="en-US" dirty="0" smtClean="0"/>
-              <a:t>业务</a:t>
-            </a:r>
-            <a:r>
-              <a:rPr kumimoji="1" lang="zh-CN" altLang="en-US" dirty="0" smtClean="0"/>
-              <a:t>服务器</a:t>
+              <a:t>业务服务器</a:t>
             </a:r>
             <a:endParaRPr kumimoji="1" lang="en-US" altLang="zh-CN" dirty="0" smtClean="0"/>
           </a:p>
@@ -4328,12 +4320,26 @@
           <a:lstStyle/>
           <a:p>
             <a:r>
+              <a:rPr kumimoji="1" lang="zh-CN" altLang="en-US" dirty="0" smtClean="0"/>
+              <a:t>解决方案介绍</a:t>
+            </a:r>
+            <a:endParaRPr kumimoji="1" lang="en-US" altLang="zh-CN" dirty="0" smtClean="0"/>
+          </a:p>
+          <a:p>
+            <a:r>
+              <a:rPr kumimoji="1" lang="zh-CN" altLang="en-US" dirty="0" smtClean="0"/>
+              <a:t>服务器整体介绍</a:t>
+            </a:r>
+            <a:endParaRPr kumimoji="1" lang="en-US" altLang="zh-CN" dirty="0" smtClean="0"/>
+          </a:p>
+          <a:p>
+            <a:r>
               <a:rPr kumimoji="1" lang="zh-CN" altLang="en-US" dirty="0" smtClean="0">
                 <a:solidFill>
                   <a:srgbClr val="FF0000"/>
                 </a:solidFill>
               </a:rPr>
-              <a:t>解决方案介绍</a:t>
+              <a:t>设备服务器</a:t>
             </a:r>
             <a:endParaRPr kumimoji="1" lang="en-US" altLang="zh-CN" dirty="0" smtClean="0">
               <a:solidFill>
@@ -4344,32 +4350,14 @@
           <a:p>
             <a:r>
               <a:rPr kumimoji="1" lang="zh-CN" altLang="en-US" dirty="0" smtClean="0"/>
-              <a:t>服务器整体介绍</a:t>
+              <a:t>数据服务器</a:t>
             </a:r>
             <a:endParaRPr kumimoji="1" lang="en-US" altLang="zh-CN" dirty="0" smtClean="0"/>
           </a:p>
           <a:p>
             <a:r>
               <a:rPr kumimoji="1" lang="zh-CN" altLang="en-US" dirty="0" smtClean="0"/>
-              <a:t>设备服务器</a:t>
-            </a:r>
-            <a:endParaRPr kumimoji="1" lang="en-US" altLang="zh-CN" dirty="0" smtClean="0"/>
-          </a:p>
-          <a:p>
-            <a:r>
-              <a:rPr kumimoji="1" lang="zh-CN" altLang="en-US" dirty="0" smtClean="0"/>
-              <a:t>数据服务器</a:t>
-            </a:r>
-            <a:endParaRPr kumimoji="1" lang="en-US" altLang="zh-CN" dirty="0" smtClean="0"/>
-          </a:p>
-          <a:p>
-            <a:r>
-              <a:rPr kumimoji="1" lang="zh-CN" altLang="en-US" dirty="0" smtClean="0"/>
-              <a:t>业务</a:t>
-            </a:r>
-            <a:r>
-              <a:rPr kumimoji="1" lang="zh-CN" altLang="en-US" dirty="0" smtClean="0"/>
-              <a:t>服务器</a:t>
+              <a:t>业务服务器</a:t>
             </a:r>
             <a:endParaRPr kumimoji="1" lang="en-US" altLang="zh-CN" dirty="0" smtClean="0"/>
           </a:p>
@@ -4434,26 +4422,461 @@
           <a:bodyPr/>
           <a:lstStyle/>
           <a:p>
-            <a:endParaRPr kumimoji="1" lang="zh-CN" altLang="en-US"/>
-          </a:p>
-        </p:txBody>
-      </p:sp>
-      <p:sp>
-        <p:nvSpPr>
-          <p:cNvPr id="3" name="内容占位符 2"/>
-          <p:cNvSpPr>
-            <a:spLocks noGrp="1"/>
-          </p:cNvSpPr>
-          <p:nvPr>
-            <p:ph idx="1"/>
-          </p:nvPr>
-        </p:nvSpPr>
-        <p:spPr/>
-        <p:txBody>
-          <a:bodyPr/>
-          <a:lstStyle/>
-          <a:p>
-            <a:endParaRPr kumimoji="1" lang="zh-CN" altLang="en-US"/>
+            <a:r>
+              <a:rPr kumimoji="1" lang="zh-CN" altLang="en-US" dirty="0" smtClean="0"/>
+              <a:t>设备服务器架构</a:t>
+            </a:r>
+            <a:endParaRPr kumimoji="1" lang="zh-CN" altLang="en-US" dirty="0"/>
+          </a:p>
+        </p:txBody>
+      </p:sp>
+      <p:sp>
+        <p:nvSpPr>
+          <p:cNvPr id="4" name="矩形 3"/>
+          <p:cNvSpPr/>
+          <p:nvPr/>
+        </p:nvSpPr>
+        <p:spPr>
+          <a:xfrm>
+            <a:off x="10077195" y="1690687"/>
+            <a:ext cx="819397" cy="4845127"/>
+          </a:xfrm>
+          <a:prstGeom prst="rect">
+            <a:avLst/>
+          </a:prstGeom>
+        </p:spPr>
+        <p:style>
+          <a:lnRef idx="1">
+            <a:schemeClr val="accent3"/>
+          </a:lnRef>
+          <a:fillRef idx="2">
+            <a:schemeClr val="accent3"/>
+          </a:fillRef>
+          <a:effectRef idx="1">
+            <a:schemeClr val="accent3"/>
+          </a:effectRef>
+          <a:fontRef idx="minor">
+            <a:schemeClr val="dk1"/>
+          </a:fontRef>
+        </p:style>
+        <p:txBody>
+          <a:bodyPr rtlCol="0" anchor="ctr"/>
+          <a:lstStyle/>
+          <a:p>
+            <a:pPr algn="ctr"/>
+            <a:r>
+              <a:rPr kumimoji="1" lang="en-US" altLang="zh-CN" dirty="0" smtClean="0"/>
+              <a:t>LOG</a:t>
+            </a:r>
+            <a:endParaRPr kumimoji="1" lang="zh-CN" altLang="en-US" dirty="0"/>
+          </a:p>
+        </p:txBody>
+      </p:sp>
+      <p:sp>
+        <p:nvSpPr>
+          <p:cNvPr id="5" name="矩形 4"/>
+          <p:cNvSpPr/>
+          <p:nvPr/>
+        </p:nvSpPr>
+        <p:spPr>
+          <a:xfrm>
+            <a:off x="1057899" y="1690687"/>
+            <a:ext cx="819397" cy="4845127"/>
+          </a:xfrm>
+          <a:prstGeom prst="rect">
+            <a:avLst/>
+          </a:prstGeom>
+        </p:spPr>
+        <p:style>
+          <a:lnRef idx="1">
+            <a:schemeClr val="accent3"/>
+          </a:lnRef>
+          <a:fillRef idx="2">
+            <a:schemeClr val="accent3"/>
+          </a:fillRef>
+          <a:effectRef idx="1">
+            <a:schemeClr val="accent3"/>
+          </a:effectRef>
+          <a:fontRef idx="minor">
+            <a:schemeClr val="dk1"/>
+          </a:fontRef>
+        </p:style>
+        <p:txBody>
+          <a:bodyPr rtlCol="0" anchor="ctr"/>
+          <a:lstStyle/>
+          <a:p>
+            <a:pPr algn="ctr"/>
+            <a:r>
+              <a:rPr kumimoji="1" lang="en-US" altLang="zh-CN" dirty="0" smtClean="0"/>
+              <a:t>CFG</a:t>
+            </a:r>
+            <a:endParaRPr kumimoji="1" lang="zh-CN" altLang="en-US" dirty="0"/>
+          </a:p>
+        </p:txBody>
+      </p:sp>
+      <p:sp>
+        <p:nvSpPr>
+          <p:cNvPr id="6" name="矩形 5"/>
+          <p:cNvSpPr/>
+          <p:nvPr/>
+        </p:nvSpPr>
+        <p:spPr>
+          <a:xfrm>
+            <a:off x="2260267" y="5063275"/>
+            <a:ext cx="7433953" cy="629392"/>
+          </a:xfrm>
+          <a:prstGeom prst="rect">
+            <a:avLst/>
+          </a:prstGeom>
+        </p:spPr>
+        <p:style>
+          <a:lnRef idx="1">
+            <a:schemeClr val="accent5"/>
+          </a:lnRef>
+          <a:fillRef idx="2">
+            <a:schemeClr val="accent5"/>
+          </a:fillRef>
+          <a:effectRef idx="1">
+            <a:schemeClr val="accent5"/>
+          </a:effectRef>
+          <a:fontRef idx="minor">
+            <a:schemeClr val="dk1"/>
+          </a:fontRef>
+        </p:style>
+        <p:txBody>
+          <a:bodyPr rtlCol="0" anchor="ctr"/>
+          <a:lstStyle/>
+          <a:p>
+            <a:pPr algn="ctr"/>
+            <a:r>
+              <a:rPr kumimoji="1" lang="en-US" altLang="zh-CN" dirty="0" smtClean="0"/>
+              <a:t>EPOLL</a:t>
+            </a:r>
+            <a:endParaRPr kumimoji="1" lang="zh-CN" altLang="en-US" dirty="0"/>
+          </a:p>
+        </p:txBody>
+      </p:sp>
+      <p:sp>
+        <p:nvSpPr>
+          <p:cNvPr id="7" name="矩形 6"/>
+          <p:cNvSpPr/>
+          <p:nvPr/>
+        </p:nvSpPr>
+        <p:spPr>
+          <a:xfrm>
+            <a:off x="2260268" y="4220128"/>
+            <a:ext cx="2018806" cy="629392"/>
+          </a:xfrm>
+          <a:prstGeom prst="rect">
+            <a:avLst/>
+          </a:prstGeom>
+        </p:spPr>
+        <p:style>
+          <a:lnRef idx="1">
+            <a:schemeClr val="accent6"/>
+          </a:lnRef>
+          <a:fillRef idx="3">
+            <a:schemeClr val="accent6"/>
+          </a:fillRef>
+          <a:effectRef idx="2">
+            <a:schemeClr val="accent6"/>
+          </a:effectRef>
+          <a:fontRef idx="minor">
+            <a:schemeClr val="lt1"/>
+          </a:fontRef>
+        </p:style>
+        <p:txBody>
+          <a:bodyPr rtlCol="0" anchor="ctr"/>
+          <a:lstStyle/>
+          <a:p>
+            <a:pPr algn="ctr"/>
+            <a:r>
+              <a:rPr kumimoji="1" lang="en-US" altLang="zh-CN" dirty="0"/>
+              <a:t>PROTO_Decorat1</a:t>
+            </a:r>
+            <a:endParaRPr kumimoji="1" lang="zh-CN" altLang="en-US" dirty="0"/>
+          </a:p>
+        </p:txBody>
+      </p:sp>
+      <p:sp>
+        <p:nvSpPr>
+          <p:cNvPr id="11" name="文本框 10"/>
+          <p:cNvSpPr txBox="1"/>
+          <p:nvPr/>
+        </p:nvSpPr>
+        <p:spPr>
+          <a:xfrm>
+            <a:off x="6807030" y="4025120"/>
+            <a:ext cx="742206" cy="1015663"/>
+          </a:xfrm>
+          <a:prstGeom prst="rect">
+            <a:avLst/>
+          </a:prstGeom>
+          <a:noFill/>
+        </p:spPr>
+        <p:txBody>
+          <a:bodyPr wrap="square" rtlCol="0">
+            <a:spAutoFit/>
+          </a:bodyPr>
+          <a:lstStyle/>
+          <a:p>
+            <a:r>
+              <a:rPr kumimoji="1" lang="is-IS" altLang="zh-CN" sz="6000" dirty="0" smtClean="0"/>
+              <a:t>…</a:t>
+            </a:r>
+            <a:endParaRPr kumimoji="1" lang="zh-CN" altLang="en-US" sz="6000" dirty="0"/>
+          </a:p>
+        </p:txBody>
+      </p:sp>
+      <p:sp>
+        <p:nvSpPr>
+          <p:cNvPr id="13" name="矩形 12"/>
+          <p:cNvSpPr/>
+          <p:nvPr/>
+        </p:nvSpPr>
+        <p:spPr>
+          <a:xfrm>
+            <a:off x="4662047" y="4220128"/>
+            <a:ext cx="2018806" cy="629392"/>
+          </a:xfrm>
+          <a:prstGeom prst="rect">
+            <a:avLst/>
+          </a:prstGeom>
+        </p:spPr>
+        <p:style>
+          <a:lnRef idx="1">
+            <a:schemeClr val="accent6"/>
+          </a:lnRef>
+          <a:fillRef idx="3">
+            <a:schemeClr val="accent6"/>
+          </a:fillRef>
+          <a:effectRef idx="2">
+            <a:schemeClr val="accent6"/>
+          </a:effectRef>
+          <a:fontRef idx="minor">
+            <a:schemeClr val="lt1"/>
+          </a:fontRef>
+        </p:style>
+        <p:txBody>
+          <a:bodyPr rtlCol="0" anchor="ctr"/>
+          <a:lstStyle/>
+          <a:p>
+            <a:pPr algn="ctr"/>
+            <a:r>
+              <a:rPr kumimoji="1" lang="en-US" altLang="zh-CN" dirty="0"/>
+              <a:t>PROTO_Decorat2</a:t>
+            </a:r>
+            <a:endParaRPr kumimoji="1" lang="zh-CN" altLang="en-US" dirty="0"/>
+          </a:p>
+        </p:txBody>
+      </p:sp>
+      <p:sp>
+        <p:nvSpPr>
+          <p:cNvPr id="14" name="矩形 13"/>
+          <p:cNvSpPr/>
+          <p:nvPr/>
+        </p:nvSpPr>
+        <p:spPr>
+          <a:xfrm>
+            <a:off x="7675414" y="4220128"/>
+            <a:ext cx="2018806" cy="629392"/>
+          </a:xfrm>
+          <a:prstGeom prst="rect">
+            <a:avLst/>
+          </a:prstGeom>
+        </p:spPr>
+        <p:style>
+          <a:lnRef idx="1">
+            <a:schemeClr val="accent6"/>
+          </a:lnRef>
+          <a:fillRef idx="3">
+            <a:schemeClr val="accent6"/>
+          </a:fillRef>
+          <a:effectRef idx="2">
+            <a:schemeClr val="accent6"/>
+          </a:effectRef>
+          <a:fontRef idx="minor">
+            <a:schemeClr val="lt1"/>
+          </a:fontRef>
+        </p:style>
+        <p:txBody>
+          <a:bodyPr rtlCol="0" anchor="ctr"/>
+          <a:lstStyle/>
+          <a:p>
+            <a:pPr algn="ctr"/>
+            <a:r>
+              <a:rPr kumimoji="1" lang="en-US" altLang="zh-CN" dirty="0"/>
+              <a:t>PROTO_DecoratN</a:t>
+            </a:r>
+            <a:endParaRPr kumimoji="1" lang="zh-CN" altLang="en-US" dirty="0"/>
+          </a:p>
+        </p:txBody>
+      </p:sp>
+      <p:sp>
+        <p:nvSpPr>
+          <p:cNvPr id="15" name="矩形 14"/>
+          <p:cNvSpPr/>
+          <p:nvPr/>
+        </p:nvSpPr>
+        <p:spPr>
+          <a:xfrm>
+            <a:off x="2260265" y="3373236"/>
+            <a:ext cx="7433953" cy="629392"/>
+          </a:xfrm>
+          <a:prstGeom prst="rect">
+            <a:avLst/>
+          </a:prstGeom>
+        </p:spPr>
+        <p:style>
+          <a:lnRef idx="1">
+            <a:schemeClr val="accent6"/>
+          </a:lnRef>
+          <a:fillRef idx="3">
+            <a:schemeClr val="accent6"/>
+          </a:fillRef>
+          <a:effectRef idx="2">
+            <a:schemeClr val="accent6"/>
+          </a:effectRef>
+          <a:fontRef idx="minor">
+            <a:schemeClr val="lt1"/>
+          </a:fontRef>
+        </p:style>
+        <p:txBody>
+          <a:bodyPr rtlCol="0" anchor="ctr"/>
+          <a:lstStyle/>
+          <a:p>
+            <a:pPr algn="ctr"/>
+            <a:r>
+              <a:rPr kumimoji="1" lang="en-US" altLang="zh-CN" dirty="0" smtClean="0"/>
+              <a:t>PROTO_Base</a:t>
+            </a:r>
+            <a:endParaRPr kumimoji="1" lang="zh-CN" altLang="en-US" dirty="0"/>
+          </a:p>
+        </p:txBody>
+      </p:sp>
+      <p:sp>
+        <p:nvSpPr>
+          <p:cNvPr id="16" name="矩形 15"/>
+          <p:cNvSpPr/>
+          <p:nvPr/>
+        </p:nvSpPr>
+        <p:spPr>
+          <a:xfrm>
+            <a:off x="2260266" y="5906422"/>
+            <a:ext cx="7433953" cy="629392"/>
+          </a:xfrm>
+          <a:prstGeom prst="rect">
+            <a:avLst/>
+          </a:prstGeom>
+        </p:spPr>
+        <p:style>
+          <a:lnRef idx="0">
+            <a:schemeClr val="accent5"/>
+          </a:lnRef>
+          <a:fillRef idx="3">
+            <a:schemeClr val="accent5"/>
+          </a:fillRef>
+          <a:effectRef idx="3">
+            <a:schemeClr val="accent5"/>
+          </a:effectRef>
+          <a:fontRef idx="minor">
+            <a:schemeClr val="lt1"/>
+          </a:fontRef>
+        </p:style>
+        <p:txBody>
+          <a:bodyPr rtlCol="0" anchor="ctr"/>
+          <a:lstStyle/>
+          <a:p>
+            <a:pPr algn="ctr"/>
+            <a:r>
+              <a:rPr kumimoji="1" lang="en-US" altLang="zh-CN" dirty="0" smtClean="0"/>
+              <a:t>OAL</a:t>
+            </a:r>
+            <a:endParaRPr kumimoji="1" lang="zh-CN" altLang="en-US" dirty="0"/>
+          </a:p>
+        </p:txBody>
+      </p:sp>
+      <p:sp>
+        <p:nvSpPr>
+          <p:cNvPr id="17" name="矩形 16"/>
+          <p:cNvSpPr/>
+          <p:nvPr/>
+        </p:nvSpPr>
+        <p:spPr>
+          <a:xfrm>
+            <a:off x="2260269" y="1690688"/>
+            <a:ext cx="7433953" cy="629392"/>
+          </a:xfrm>
+          <a:prstGeom prst="rect">
+            <a:avLst/>
+          </a:prstGeom>
+        </p:spPr>
+        <p:style>
+          <a:lnRef idx="0">
+            <a:schemeClr val="accent2"/>
+          </a:lnRef>
+          <a:fillRef idx="3">
+            <a:schemeClr val="accent2"/>
+          </a:fillRef>
+          <a:effectRef idx="3">
+            <a:schemeClr val="accent2"/>
+          </a:effectRef>
+          <a:fontRef idx="minor">
+            <a:schemeClr val="lt1"/>
+          </a:fontRef>
+        </p:style>
+        <p:txBody>
+          <a:bodyPr rtlCol="0" anchor="ctr"/>
+          <a:lstStyle/>
+          <a:p>
+            <a:pPr algn="ctr"/>
+            <a:r>
+              <a:rPr kumimoji="1" lang="en-US" altLang="zh-CN" dirty="0" smtClean="0"/>
+              <a:t>IO-Server-Agent</a:t>
+            </a:r>
+            <a:endParaRPr kumimoji="1" lang="zh-CN" altLang="en-US" dirty="0"/>
+          </a:p>
+        </p:txBody>
+      </p:sp>
+      <p:sp>
+        <p:nvSpPr>
+          <p:cNvPr id="18" name="矩形 17"/>
+          <p:cNvSpPr/>
+          <p:nvPr/>
+        </p:nvSpPr>
+        <p:spPr>
+          <a:xfrm>
+            <a:off x="2260268" y="2533835"/>
+            <a:ext cx="7433953" cy="629392"/>
+          </a:xfrm>
+          <a:prstGeom prst="rect">
+            <a:avLst/>
+          </a:prstGeom>
+        </p:spPr>
+        <p:style>
+          <a:lnRef idx="0">
+            <a:schemeClr val="accent4"/>
+          </a:lnRef>
+          <a:fillRef idx="3">
+            <a:schemeClr val="accent4"/>
+          </a:fillRef>
+          <a:effectRef idx="3">
+            <a:schemeClr val="accent4"/>
+          </a:effectRef>
+          <a:fontRef idx="minor">
+            <a:schemeClr val="lt1"/>
+          </a:fontRef>
+        </p:style>
+        <p:txBody>
+          <a:bodyPr rtlCol="0" anchor="ctr"/>
+          <a:lstStyle/>
+          <a:p>
+            <a:pPr algn="ctr"/>
+            <a:r>
+              <a:rPr kumimoji="1" lang="en-US" altLang="zh-CN" dirty="0" smtClean="0"/>
+              <a:t>DEV-MNG</a:t>
+            </a:r>
+            <a:endParaRPr kumimoji="1" lang="zh-CN" altLang="en-US" dirty="0"/>
           </a:p>
         </p:txBody>
       </p:sp>

</xml_diff>